<commit_message>
Cambiando iconos de X
</commit_message>
<xml_diff>
--- a/Memoria/HiperSerializer.pptx
+++ b/Memoria/HiperSerializer.pptx
@@ -11961,42 +11961,6 @@
       </p:sp>
       <p:sp>
         <p:nvSpPr>
-          <p:cNvPr id="85" name="84 Rectángulo"/>
-          <p:cNvSpPr/>
-          <p:nvPr/>
-        </p:nvSpPr>
-        <p:spPr>
-          <a:xfrm>
-            <a:off x="4000496" y="4643446"/>
-            <a:ext cx="429925" cy="369332"/>
-          </a:xfrm>
-          <a:prstGeom prst="rect">
-            <a:avLst/>
-          </a:prstGeom>
-        </p:spPr>
-        <p:txBody>
-          <a:bodyPr wrap="none">
-            <a:spAutoFit/>
-          </a:bodyPr>
-          <a:lstStyle/>
-          <a:p>
-            <a:pPr algn="ctr">
-              <a:defRPr/>
-            </a:pPr>
-            <a:r>
-              <a:rPr lang="en-US" b="1" dirty="0" smtClean="0">
-                <a:solidFill>
-                  <a:srgbClr val="FF0000"/>
-                </a:solidFill>
-                <a:latin typeface="Wingdings" pitchFamily="2" charset="2"/>
-              </a:rPr>
-              <a:t>x</a:t>
-            </a:r>
-          </a:p>
-        </p:txBody>
-      </p:sp>
-      <p:sp>
-        <p:nvSpPr>
           <p:cNvPr id="86" name="85 Rectángulo"/>
           <p:cNvSpPr/>
           <p:nvPr/>
@@ -12465,42 +12429,6 @@
       </p:sp>
       <p:sp>
         <p:nvSpPr>
-          <p:cNvPr id="99" name="98 Rectángulo"/>
-          <p:cNvSpPr/>
-          <p:nvPr/>
-        </p:nvSpPr>
-        <p:spPr>
-          <a:xfrm>
-            <a:off x="7213909" y="4643446"/>
-            <a:ext cx="429925" cy="369332"/>
-          </a:xfrm>
-          <a:prstGeom prst="rect">
-            <a:avLst/>
-          </a:prstGeom>
-        </p:spPr>
-        <p:txBody>
-          <a:bodyPr wrap="none">
-            <a:spAutoFit/>
-          </a:bodyPr>
-          <a:lstStyle/>
-          <a:p>
-            <a:pPr algn="ctr">
-              <a:defRPr/>
-            </a:pPr>
-            <a:r>
-              <a:rPr lang="en-US" b="1" dirty="0" smtClean="0">
-                <a:solidFill>
-                  <a:srgbClr val="FF0000"/>
-                </a:solidFill>
-                <a:latin typeface="Wingdings" pitchFamily="2" charset="2"/>
-              </a:rPr>
-              <a:t>x</a:t>
-            </a:r>
-          </a:p>
-        </p:txBody>
-      </p:sp>
-      <p:sp>
-        <p:nvSpPr>
           <p:cNvPr id="104" name="103 Rectángulo"/>
           <p:cNvSpPr/>
           <p:nvPr/>
@@ -12676,6 +12604,84 @@
                 <a:schemeClr val="bg1"/>
               </a:solidFill>
             </a:endParaRPr>
+          </a:p>
+        </p:txBody>
+      </p:sp>
+      <p:sp>
+        <p:nvSpPr>
+          <p:cNvPr id="47" name="46 Rectángulo"/>
+          <p:cNvSpPr/>
+          <p:nvPr/>
+        </p:nvSpPr>
+        <p:spPr>
+          <a:xfrm>
+            <a:off x="4000496" y="4714884"/>
+            <a:ext cx="365805" cy="369332"/>
+          </a:xfrm>
+          <a:prstGeom prst="rect">
+            <a:avLst/>
+          </a:prstGeom>
+        </p:spPr>
+        <p:txBody>
+          <a:bodyPr wrap="none">
+            <a:spAutoFit/>
+          </a:bodyPr>
+          <a:lstStyle/>
+          <a:p>
+            <a:pPr algn="ctr">
+              <a:defRPr/>
+            </a:pPr>
+            <a:r>
+              <a:rPr lang="en-US" b="1" dirty="0" smtClean="0">
+                <a:solidFill>
+                  <a:srgbClr val="009900"/>
+                </a:solidFill>
+                <a:latin typeface="Wingdings" pitchFamily="2" charset="2"/>
+              </a:rPr>
+              <a:t>ü</a:t>
+            </a:r>
+            <a:endParaRPr lang="en-US" b="1" dirty="0" smtClean="0">
+              <a:solidFill>
+                <a:srgbClr val="009900"/>
+              </a:solidFill>
+              <a:latin typeface="Wingdings" pitchFamily="2" charset="2"/>
+            </a:endParaRPr>
+          </a:p>
+        </p:txBody>
+      </p:sp>
+      <p:sp>
+        <p:nvSpPr>
+          <p:cNvPr id="49" name="48 Rectángulo"/>
+          <p:cNvSpPr/>
+          <p:nvPr/>
+        </p:nvSpPr>
+        <p:spPr>
+          <a:xfrm>
+            <a:off x="7278029" y="4714884"/>
+            <a:ext cx="365805" cy="369332"/>
+          </a:xfrm>
+          <a:prstGeom prst="rect">
+            <a:avLst/>
+          </a:prstGeom>
+        </p:spPr>
+        <p:txBody>
+          <a:bodyPr wrap="none">
+            <a:spAutoFit/>
+          </a:bodyPr>
+          <a:lstStyle/>
+          <a:p>
+            <a:pPr algn="ctr">
+              <a:defRPr/>
+            </a:pPr>
+            <a:r>
+              <a:rPr lang="en-US" b="1" dirty="0" smtClean="0">
+                <a:solidFill>
+                  <a:srgbClr val="009900"/>
+                </a:solidFill>
+                <a:latin typeface="Wingdings" pitchFamily="2" charset="2"/>
+              </a:rPr>
+              <a:t>ü</a:t>
+            </a:r>
           </a:p>
         </p:txBody>
       </p:sp>
@@ -14695,42 +14701,6 @@
       </p:sp>
       <p:sp>
         <p:nvSpPr>
-          <p:cNvPr id="108" name="107 Rectángulo"/>
-          <p:cNvSpPr/>
-          <p:nvPr/>
-        </p:nvSpPr>
-        <p:spPr>
-          <a:xfrm>
-            <a:off x="8072462" y="4488428"/>
-            <a:ext cx="429925" cy="369332"/>
-          </a:xfrm>
-          <a:prstGeom prst="rect">
-            <a:avLst/>
-          </a:prstGeom>
-        </p:spPr>
-        <p:txBody>
-          <a:bodyPr wrap="none">
-            <a:spAutoFit/>
-          </a:bodyPr>
-          <a:lstStyle/>
-          <a:p>
-            <a:pPr algn="ctr">
-              <a:defRPr/>
-            </a:pPr>
-            <a:r>
-              <a:rPr lang="en-US" b="1" dirty="0" smtClean="0">
-                <a:solidFill>
-                  <a:srgbClr val="FF0000"/>
-                </a:solidFill>
-                <a:latin typeface="Wingdings" pitchFamily="2" charset="2"/>
-              </a:rPr>
-              <a:t>x</a:t>
-            </a:r>
-          </a:p>
-        </p:txBody>
-      </p:sp>
-      <p:sp>
-        <p:nvSpPr>
           <p:cNvPr id="109" name="108 Rectángulo"/>
           <p:cNvSpPr/>
           <p:nvPr/>
@@ -14905,6 +14875,42 @@
                 <a:latin typeface="Wingdings" pitchFamily="2" charset="2"/>
               </a:rPr>
               <a:t>x</a:t>
+            </a:r>
+          </a:p>
+        </p:txBody>
+      </p:sp>
+      <p:sp>
+        <p:nvSpPr>
+          <p:cNvPr id="47" name="46 Rectángulo"/>
+          <p:cNvSpPr/>
+          <p:nvPr/>
+        </p:nvSpPr>
+        <p:spPr>
+          <a:xfrm>
+            <a:off x="8143900" y="4488428"/>
+            <a:ext cx="365806" cy="369332"/>
+          </a:xfrm>
+          <a:prstGeom prst="rect">
+            <a:avLst/>
+          </a:prstGeom>
+        </p:spPr>
+        <p:txBody>
+          <a:bodyPr wrap="none">
+            <a:spAutoFit/>
+          </a:bodyPr>
+          <a:lstStyle/>
+          <a:p>
+            <a:pPr algn="ctr">
+              <a:defRPr/>
+            </a:pPr>
+            <a:r>
+              <a:rPr lang="en-US" b="1" dirty="0" smtClean="0">
+                <a:solidFill>
+                  <a:srgbClr val="009900"/>
+                </a:solidFill>
+                <a:latin typeface="Wingdings" pitchFamily="2" charset="2"/>
+              </a:rPr>
+              <a:t>ü</a:t>
             </a:r>
           </a:p>
         </p:txBody>

</xml_diff>